<commit_message>
Initilise SAP mobile sdk project
</commit_message>
<xml_diff>
--- a/Documentations/structure_diagrams.pptx
+++ b/Documentations/structure_diagrams.pptx
@@ -5,15 +5,16 @@
     <p:sldMasterId id="2147483648" r:id="rId1"/>
   </p:sldMasterIdLst>
   <p:notesMasterIdLst>
-    <p:notesMasterId r:id="rId8"/>
+    <p:notesMasterId r:id="rId9"/>
   </p:notesMasterIdLst>
   <p:sldIdLst>
     <p:sldId id="257" r:id="rId2"/>
     <p:sldId id="256" r:id="rId3"/>
     <p:sldId id="260" r:id="rId4"/>
     <p:sldId id="261" r:id="rId5"/>
-    <p:sldId id="262" r:id="rId6"/>
-    <p:sldId id="258" r:id="rId7"/>
+    <p:sldId id="263" r:id="rId6"/>
+    <p:sldId id="262" r:id="rId7"/>
+    <p:sldId id="258" r:id="rId8"/>
   </p:sldIdLst>
   <p:sldSz cx="12192000" cy="6858000"/>
   <p:notesSz cx="6858000" cy="9144000"/>
@@ -3030,7 +3031,7 @@
           <a:p>
             <a:fld id="{BD9E72BA-B64C-481F-93A8-E4D26CDED7CB}" type="datetimeFigureOut">
               <a:rPr lang="en-SG" smtClean="0"/>
-              <a:t>7/1/2019</a:t>
+              <a:t>9/1/2019</a:t>
             </a:fld>
             <a:endParaRPr lang="en-SG"/>
           </a:p>
@@ -3513,7 +3514,7 @@
           <a:p>
             <a:fld id="{E6B29F7E-10B4-4321-AA2C-B0E4C26EEF29}" type="datetimeFigureOut">
               <a:rPr lang="en-SG" smtClean="0"/>
-              <a:t>7/1/2019</a:t>
+              <a:t>9/1/2019</a:t>
             </a:fld>
             <a:endParaRPr lang="en-SG"/>
           </a:p>
@@ -3683,7 +3684,7 @@
           <a:p>
             <a:fld id="{E6B29F7E-10B4-4321-AA2C-B0E4C26EEF29}" type="datetimeFigureOut">
               <a:rPr lang="en-SG" smtClean="0"/>
-              <a:t>7/1/2019</a:t>
+              <a:t>9/1/2019</a:t>
             </a:fld>
             <a:endParaRPr lang="en-SG"/>
           </a:p>
@@ -3863,7 +3864,7 @@
           <a:p>
             <a:fld id="{E6B29F7E-10B4-4321-AA2C-B0E4C26EEF29}" type="datetimeFigureOut">
               <a:rPr lang="en-SG" smtClean="0"/>
-              <a:t>7/1/2019</a:t>
+              <a:t>9/1/2019</a:t>
             </a:fld>
             <a:endParaRPr lang="en-SG"/>
           </a:p>
@@ -4033,7 +4034,7 @@
           <a:p>
             <a:fld id="{E6B29F7E-10B4-4321-AA2C-B0E4C26EEF29}" type="datetimeFigureOut">
               <a:rPr lang="en-SG" smtClean="0"/>
-              <a:t>7/1/2019</a:t>
+              <a:t>9/1/2019</a:t>
             </a:fld>
             <a:endParaRPr lang="en-SG"/>
           </a:p>
@@ -4279,7 +4280,7 @@
           <a:p>
             <a:fld id="{E6B29F7E-10B4-4321-AA2C-B0E4C26EEF29}" type="datetimeFigureOut">
               <a:rPr lang="en-SG" smtClean="0"/>
-              <a:t>7/1/2019</a:t>
+              <a:t>9/1/2019</a:t>
             </a:fld>
             <a:endParaRPr lang="en-SG"/>
           </a:p>
@@ -4511,7 +4512,7 @@
           <a:p>
             <a:fld id="{E6B29F7E-10B4-4321-AA2C-B0E4C26EEF29}" type="datetimeFigureOut">
               <a:rPr lang="en-SG" smtClean="0"/>
-              <a:t>7/1/2019</a:t>
+              <a:t>9/1/2019</a:t>
             </a:fld>
             <a:endParaRPr lang="en-SG"/>
           </a:p>
@@ -4878,7 +4879,7 @@
           <a:p>
             <a:fld id="{E6B29F7E-10B4-4321-AA2C-B0E4C26EEF29}" type="datetimeFigureOut">
               <a:rPr lang="en-SG" smtClean="0"/>
-              <a:t>7/1/2019</a:t>
+              <a:t>9/1/2019</a:t>
             </a:fld>
             <a:endParaRPr lang="en-SG"/>
           </a:p>
@@ -4996,7 +4997,7 @@
           <a:p>
             <a:fld id="{E6B29F7E-10B4-4321-AA2C-B0E4C26EEF29}" type="datetimeFigureOut">
               <a:rPr lang="en-SG" smtClean="0"/>
-              <a:t>7/1/2019</a:t>
+              <a:t>9/1/2019</a:t>
             </a:fld>
             <a:endParaRPr lang="en-SG"/>
           </a:p>
@@ -5091,7 +5092,7 @@
           <a:p>
             <a:fld id="{E6B29F7E-10B4-4321-AA2C-B0E4C26EEF29}" type="datetimeFigureOut">
               <a:rPr lang="en-SG" smtClean="0"/>
-              <a:t>7/1/2019</a:t>
+              <a:t>9/1/2019</a:t>
             </a:fld>
             <a:endParaRPr lang="en-SG"/>
           </a:p>
@@ -5368,7 +5369,7 @@
           <a:p>
             <a:fld id="{E6B29F7E-10B4-4321-AA2C-B0E4C26EEF29}" type="datetimeFigureOut">
               <a:rPr lang="en-SG" smtClean="0"/>
-              <a:t>7/1/2019</a:t>
+              <a:t>9/1/2019</a:t>
             </a:fld>
             <a:endParaRPr lang="en-SG"/>
           </a:p>
@@ -5621,7 +5622,7 @@
           <a:p>
             <a:fld id="{E6B29F7E-10B4-4321-AA2C-B0E4C26EEF29}" type="datetimeFigureOut">
               <a:rPr lang="en-SG" smtClean="0"/>
-              <a:t>7/1/2019</a:t>
+              <a:t>9/1/2019</a:t>
             </a:fld>
             <a:endParaRPr lang="en-SG"/>
           </a:p>
@@ -5834,7 +5835,7 @@
           <a:p>
             <a:fld id="{E6B29F7E-10B4-4321-AA2C-B0E4C26EEF29}" type="datetimeFigureOut">
               <a:rPr lang="en-SG" smtClean="0"/>
-              <a:t>7/1/2019</a:t>
+              <a:t>9/1/2019</a:t>
             </a:fld>
             <a:endParaRPr lang="en-SG"/>
           </a:p>
@@ -10715,6 +10716,632 @@
 </file>
 
 <file path=ppt/slides/slide5.xml><?xml version="1.0" encoding="utf-8"?>
+<p:sld xmlns:a="http://schemas.openxmlformats.org/drawingml/2006/main" xmlns:r="http://schemas.openxmlformats.org/officeDocument/2006/relationships" xmlns:p="http://schemas.openxmlformats.org/presentationml/2006/main">
+  <p:cSld>
+    <p:spTree>
+      <p:nvGrpSpPr>
+        <p:cNvPr id="1" name=""/>
+        <p:cNvGrpSpPr/>
+        <p:nvPr/>
+      </p:nvGrpSpPr>
+      <p:grpSpPr>
+        <a:xfrm>
+          <a:off x="0" y="0"/>
+          <a:ext cx="0" cy="0"/>
+          <a:chOff x="0" y="0"/>
+          <a:chExt cx="0" cy="0"/>
+        </a:xfrm>
+      </p:grpSpPr>
+      <p:sp>
+        <p:nvSpPr>
+          <p:cNvPr id="3" name="Rectangle 2"/>
+          <p:cNvSpPr/>
+          <p:nvPr/>
+        </p:nvSpPr>
+        <p:spPr>
+          <a:xfrm>
+            <a:off x="208367" y="174842"/>
+            <a:ext cx="11829558" cy="5231171"/>
+          </a:xfrm>
+          <a:prstGeom prst="rect">
+            <a:avLst/>
+          </a:prstGeom>
+        </p:spPr>
+        <p:style>
+          <a:lnRef idx="3">
+            <a:schemeClr val="lt1"/>
+          </a:lnRef>
+          <a:fillRef idx="1">
+            <a:schemeClr val="accent6"/>
+          </a:fillRef>
+          <a:effectRef idx="1">
+            <a:schemeClr val="accent6"/>
+          </a:effectRef>
+          <a:fontRef idx="minor">
+            <a:schemeClr val="lt1"/>
+          </a:fontRef>
+        </p:style>
+        <p:txBody>
+          <a:bodyPr rtlCol="0" anchor="t"/>
+          <a:lstStyle/>
+          <a:p>
+            <a:pPr algn="ctr"/>
+            <a:r>
+              <a:rPr lang="en-SG" dirty="0" err="1"/>
+              <a:t>SmartBackpack</a:t>
+            </a:r>
+            <a:endParaRPr lang="en-SG" dirty="0"/>
+          </a:p>
+          <a:p>
+            <a:pPr algn="ctr"/>
+            <a:r>
+              <a:rPr lang="en-SG" dirty="0" smtClean="0"/>
+              <a:t>Android App</a:t>
+            </a:r>
+            <a:endParaRPr lang="en-SG" dirty="0"/>
+          </a:p>
+        </p:txBody>
+      </p:sp>
+      <p:sp>
+        <p:nvSpPr>
+          <p:cNvPr id="24" name="Round Diagonal Corner Rectangle 23"/>
+          <p:cNvSpPr/>
+          <p:nvPr/>
+        </p:nvSpPr>
+        <p:spPr>
+          <a:xfrm>
+            <a:off x="411982" y="5526716"/>
+            <a:ext cx="5169668" cy="1042263"/>
+          </a:xfrm>
+          <a:prstGeom prst="round2DiagRect">
+            <a:avLst/>
+          </a:prstGeom>
+          <a:solidFill>
+            <a:srgbClr val="E87C6A"/>
+          </a:solidFill>
+        </p:spPr>
+        <p:style>
+          <a:lnRef idx="2">
+            <a:schemeClr val="accent1">
+              <a:shade val="50000"/>
+            </a:schemeClr>
+          </a:lnRef>
+          <a:fillRef idx="1">
+            <a:schemeClr val="accent1"/>
+          </a:fillRef>
+          <a:effectRef idx="0">
+            <a:schemeClr val="accent1"/>
+          </a:effectRef>
+          <a:fontRef idx="minor">
+            <a:schemeClr val="lt1"/>
+          </a:fontRef>
+        </p:style>
+        <p:txBody>
+          <a:bodyPr rtlCol="0" anchor="ctr"/>
+          <a:lstStyle/>
+          <a:p>
+            <a:pPr algn="ctr"/>
+            <a:r>
+              <a:rPr lang="en-SG" dirty="0" err="1" smtClean="0"/>
+              <a:t>SmartBackpack</a:t>
+            </a:r>
+            <a:endParaRPr lang="en-SG" dirty="0" smtClean="0"/>
+          </a:p>
+          <a:p>
+            <a:pPr algn="ctr"/>
+            <a:r>
+              <a:rPr lang="en-SG" dirty="0" smtClean="0"/>
+              <a:t>IOT</a:t>
+            </a:r>
+          </a:p>
+          <a:p>
+            <a:pPr algn="ctr"/>
+            <a:r>
+              <a:rPr lang="en-SG" dirty="0" smtClean="0"/>
+              <a:t>Device</a:t>
+            </a:r>
+            <a:endParaRPr lang="en-SG" dirty="0"/>
+          </a:p>
+        </p:txBody>
+      </p:sp>
+      <p:sp>
+        <p:nvSpPr>
+          <p:cNvPr id="36" name="Round Diagonal Corner Rectangle 35"/>
+          <p:cNvSpPr/>
+          <p:nvPr/>
+        </p:nvSpPr>
+        <p:spPr>
+          <a:xfrm>
+            <a:off x="3756271" y="1760705"/>
+            <a:ext cx="2116730" cy="3131695"/>
+          </a:xfrm>
+          <a:prstGeom prst="round2DiagRect">
+            <a:avLst/>
+          </a:prstGeom>
+          <a:effectLst/>
+        </p:spPr>
+        <p:style>
+          <a:lnRef idx="2">
+            <a:schemeClr val="accent1">
+              <a:shade val="50000"/>
+            </a:schemeClr>
+          </a:lnRef>
+          <a:fillRef idx="1">
+            <a:schemeClr val="accent1"/>
+          </a:fillRef>
+          <a:effectRef idx="0">
+            <a:schemeClr val="accent1"/>
+          </a:effectRef>
+          <a:fontRef idx="minor">
+            <a:schemeClr val="lt1"/>
+          </a:fontRef>
+        </p:style>
+        <p:txBody>
+          <a:bodyPr rtlCol="0" anchor="ctr"/>
+          <a:lstStyle/>
+          <a:p>
+            <a:pPr algn="ctr"/>
+            <a:r>
+              <a:rPr lang="en-SG" dirty="0" smtClean="0"/>
+              <a:t>Get sensor data and display values</a:t>
+            </a:r>
+          </a:p>
+          <a:p>
+            <a:pPr algn="ctr"/>
+            <a:endParaRPr lang="en-SG" dirty="0"/>
+          </a:p>
+          <a:p>
+            <a:pPr algn="ctr"/>
+            <a:r>
+              <a:rPr lang="en-SG" dirty="0" smtClean="0"/>
+              <a:t>With the predictive suggestions below</a:t>
+            </a:r>
+          </a:p>
+          <a:p>
+            <a:pPr algn="ctr"/>
+            <a:endParaRPr lang="en-SG" dirty="0"/>
+          </a:p>
+          <a:p>
+            <a:pPr algn="ctr"/>
+            <a:r>
+              <a:rPr lang="en-SG" dirty="0" smtClean="0"/>
+              <a:t>Historical data below</a:t>
+            </a:r>
+            <a:endParaRPr lang="en-SG" dirty="0"/>
+          </a:p>
+        </p:txBody>
+      </p:sp>
+      <p:sp>
+        <p:nvSpPr>
+          <p:cNvPr id="2" name="Down Arrow 1"/>
+          <p:cNvSpPr/>
+          <p:nvPr/>
+        </p:nvSpPr>
+        <p:spPr>
+          <a:xfrm>
+            <a:off x="1167344" y="0"/>
+            <a:ext cx="593387" cy="1640003"/>
+          </a:xfrm>
+          <a:prstGeom prst="downArrow">
+            <a:avLst/>
+          </a:prstGeom>
+        </p:spPr>
+        <p:style>
+          <a:lnRef idx="2">
+            <a:schemeClr val="accent1">
+              <a:shade val="50000"/>
+            </a:schemeClr>
+          </a:lnRef>
+          <a:fillRef idx="1">
+            <a:schemeClr val="accent1"/>
+          </a:fillRef>
+          <a:effectRef idx="0">
+            <a:schemeClr val="accent1"/>
+          </a:effectRef>
+          <a:fontRef idx="minor">
+            <a:schemeClr val="lt1"/>
+          </a:fontRef>
+        </p:style>
+        <p:txBody>
+          <a:bodyPr vert="eaVert" rtlCol="0" anchor="ctr"/>
+          <a:lstStyle/>
+          <a:p>
+            <a:pPr algn="ctr"/>
+            <a:r>
+              <a:rPr lang="en-SG" dirty="0" smtClean="0"/>
+              <a:t>Launch</a:t>
+            </a:r>
+            <a:endParaRPr lang="en-SG" dirty="0"/>
+          </a:p>
+        </p:txBody>
+      </p:sp>
+      <p:sp>
+        <p:nvSpPr>
+          <p:cNvPr id="4" name="Rectangle 3"/>
+          <p:cNvSpPr/>
+          <p:nvPr/>
+        </p:nvSpPr>
+        <p:spPr>
+          <a:xfrm>
+            <a:off x="405673" y="1760706"/>
+            <a:ext cx="2116730" cy="1053181"/>
+          </a:xfrm>
+          <a:prstGeom prst="rect">
+            <a:avLst/>
+          </a:prstGeom>
+        </p:spPr>
+        <p:style>
+          <a:lnRef idx="2">
+            <a:schemeClr val="accent1">
+              <a:shade val="50000"/>
+            </a:schemeClr>
+          </a:lnRef>
+          <a:fillRef idx="1">
+            <a:schemeClr val="accent1"/>
+          </a:fillRef>
+          <a:effectRef idx="0">
+            <a:schemeClr val="accent1"/>
+          </a:effectRef>
+          <a:fontRef idx="minor">
+            <a:schemeClr val="lt1"/>
+          </a:fontRef>
+        </p:style>
+        <p:txBody>
+          <a:bodyPr rtlCol="0" anchor="ctr"/>
+          <a:lstStyle/>
+          <a:p>
+            <a:pPr algn="ctr"/>
+            <a:r>
+              <a:rPr lang="en-SG" dirty="0" smtClean="0"/>
+              <a:t>Check If user have a device nearby to pair with</a:t>
+            </a:r>
+            <a:endParaRPr lang="en-SG" dirty="0"/>
+          </a:p>
+        </p:txBody>
+      </p:sp>
+      <p:sp>
+        <p:nvSpPr>
+          <p:cNvPr id="37" name="Down Arrow 36"/>
+          <p:cNvSpPr/>
+          <p:nvPr/>
+        </p:nvSpPr>
+        <p:spPr>
+          <a:xfrm>
+            <a:off x="1167344" y="2951098"/>
+            <a:ext cx="593387" cy="872930"/>
+          </a:xfrm>
+          <a:prstGeom prst="downArrow">
+            <a:avLst/>
+          </a:prstGeom>
+        </p:spPr>
+        <p:style>
+          <a:lnRef idx="2">
+            <a:schemeClr val="accent1">
+              <a:shade val="50000"/>
+            </a:schemeClr>
+          </a:lnRef>
+          <a:fillRef idx="1">
+            <a:schemeClr val="accent1"/>
+          </a:fillRef>
+          <a:effectRef idx="0">
+            <a:schemeClr val="accent1"/>
+          </a:effectRef>
+          <a:fontRef idx="minor">
+            <a:schemeClr val="lt1"/>
+          </a:fontRef>
+        </p:style>
+        <p:txBody>
+          <a:bodyPr vert="eaVert" rtlCol="0" anchor="ctr"/>
+          <a:lstStyle/>
+          <a:p>
+            <a:pPr algn="ctr"/>
+            <a:r>
+              <a:rPr lang="en-SG" dirty="0" smtClean="0"/>
+              <a:t>no</a:t>
+            </a:r>
+            <a:endParaRPr lang="en-SG" dirty="0"/>
+          </a:p>
+        </p:txBody>
+      </p:sp>
+      <p:sp>
+        <p:nvSpPr>
+          <p:cNvPr id="41" name="Round Diagonal Corner Rectangle 40"/>
+          <p:cNvSpPr/>
+          <p:nvPr/>
+        </p:nvSpPr>
+        <p:spPr>
+          <a:xfrm>
+            <a:off x="405673" y="3989326"/>
+            <a:ext cx="2116730" cy="903075"/>
+          </a:xfrm>
+          <a:prstGeom prst="round2DiagRect">
+            <a:avLst/>
+          </a:prstGeom>
+          <a:effectLst/>
+        </p:spPr>
+        <p:style>
+          <a:lnRef idx="2">
+            <a:schemeClr val="accent1">
+              <a:shade val="50000"/>
+            </a:schemeClr>
+          </a:lnRef>
+          <a:fillRef idx="1">
+            <a:schemeClr val="accent1"/>
+          </a:fillRef>
+          <a:effectRef idx="0">
+            <a:schemeClr val="accent1"/>
+          </a:effectRef>
+          <a:fontRef idx="minor">
+            <a:schemeClr val="lt1"/>
+          </a:fontRef>
+        </p:style>
+        <p:txBody>
+          <a:bodyPr rtlCol="0" anchor="ctr"/>
+          <a:lstStyle/>
+          <a:p>
+            <a:pPr algn="ctr"/>
+            <a:r>
+              <a:rPr lang="en-SG" dirty="0" smtClean="0"/>
+              <a:t>List of IOT </a:t>
+            </a:r>
+            <a:r>
+              <a:rPr lang="en-SG" dirty="0" smtClean="0"/>
+              <a:t>devices with create option</a:t>
+            </a:r>
+            <a:endParaRPr lang="en-SG" dirty="0"/>
+          </a:p>
+        </p:txBody>
+      </p:sp>
+      <p:sp>
+        <p:nvSpPr>
+          <p:cNvPr id="46" name="Down Arrow 45"/>
+          <p:cNvSpPr/>
+          <p:nvPr/>
+        </p:nvSpPr>
+        <p:spPr>
+          <a:xfrm rot="16200000">
+            <a:off x="2833929" y="1850831"/>
+            <a:ext cx="593387" cy="872930"/>
+          </a:xfrm>
+          <a:prstGeom prst="downArrow">
+            <a:avLst/>
+          </a:prstGeom>
+        </p:spPr>
+        <p:style>
+          <a:lnRef idx="2">
+            <a:schemeClr val="accent1">
+              <a:shade val="50000"/>
+            </a:schemeClr>
+          </a:lnRef>
+          <a:fillRef idx="1">
+            <a:schemeClr val="accent1"/>
+          </a:fillRef>
+          <a:effectRef idx="0">
+            <a:schemeClr val="accent1"/>
+          </a:effectRef>
+          <a:fontRef idx="minor">
+            <a:schemeClr val="lt1"/>
+          </a:fontRef>
+        </p:style>
+        <p:txBody>
+          <a:bodyPr vert="eaVert" rtlCol="0" anchor="ctr"/>
+          <a:lstStyle/>
+          <a:p>
+            <a:pPr algn="ctr"/>
+            <a:r>
+              <a:rPr lang="en-SG" dirty="0" smtClean="0"/>
+              <a:t>yes</a:t>
+            </a:r>
+            <a:endParaRPr lang="en-SG" dirty="0"/>
+          </a:p>
+        </p:txBody>
+      </p:sp>
+      <p:sp>
+        <p:nvSpPr>
+          <p:cNvPr id="47" name="Round Diagonal Corner Rectangle 46"/>
+          <p:cNvSpPr/>
+          <p:nvPr/>
+        </p:nvSpPr>
+        <p:spPr>
+          <a:xfrm>
+            <a:off x="7772403" y="1706311"/>
+            <a:ext cx="2116730" cy="905285"/>
+          </a:xfrm>
+          <a:prstGeom prst="round2DiagRect">
+            <a:avLst/>
+          </a:prstGeom>
+          <a:effectLst/>
+        </p:spPr>
+        <p:style>
+          <a:lnRef idx="2">
+            <a:schemeClr val="accent1">
+              <a:shade val="50000"/>
+            </a:schemeClr>
+          </a:lnRef>
+          <a:fillRef idx="1">
+            <a:schemeClr val="accent1"/>
+          </a:fillRef>
+          <a:effectRef idx="0">
+            <a:schemeClr val="accent1"/>
+          </a:effectRef>
+          <a:fontRef idx="minor">
+            <a:schemeClr val="lt1"/>
+          </a:fontRef>
+        </p:style>
+        <p:txBody>
+          <a:bodyPr rtlCol="0" anchor="ctr"/>
+          <a:lstStyle/>
+          <a:p>
+            <a:pPr algn="ctr"/>
+            <a:r>
+              <a:rPr lang="en-SG" dirty="0" smtClean="0"/>
+              <a:t>User Profile</a:t>
+            </a:r>
+          </a:p>
+          <a:p>
+            <a:pPr algn="ctr"/>
+            <a:r>
+              <a:rPr lang="en-SG" dirty="0" smtClean="0"/>
+              <a:t>With RUD options</a:t>
+            </a:r>
+            <a:endParaRPr lang="en-SG" dirty="0"/>
+          </a:p>
+        </p:txBody>
+      </p:sp>
+      <p:sp>
+        <p:nvSpPr>
+          <p:cNvPr id="48" name="Round Diagonal Corner Rectangle 47"/>
+          <p:cNvSpPr/>
+          <p:nvPr/>
+        </p:nvSpPr>
+        <p:spPr>
+          <a:xfrm>
+            <a:off x="7897098" y="3989326"/>
+            <a:ext cx="2116730" cy="905285"/>
+          </a:xfrm>
+          <a:prstGeom prst="round2DiagRect">
+            <a:avLst/>
+          </a:prstGeom>
+          <a:effectLst/>
+        </p:spPr>
+        <p:style>
+          <a:lnRef idx="2">
+            <a:schemeClr val="accent1">
+              <a:shade val="50000"/>
+            </a:schemeClr>
+          </a:lnRef>
+          <a:fillRef idx="1">
+            <a:schemeClr val="accent1"/>
+          </a:fillRef>
+          <a:effectRef idx="0">
+            <a:schemeClr val="accent1"/>
+          </a:effectRef>
+          <a:fontRef idx="minor">
+            <a:schemeClr val="lt1"/>
+          </a:fontRef>
+        </p:style>
+        <p:txBody>
+          <a:bodyPr rtlCol="0" anchor="ctr"/>
+          <a:lstStyle/>
+          <a:p>
+            <a:pPr algn="ctr"/>
+            <a:r>
+              <a:rPr lang="en-SG" dirty="0" smtClean="0"/>
+              <a:t>Device Settings Page</a:t>
+            </a:r>
+            <a:endParaRPr lang="en-SG" dirty="0"/>
+          </a:p>
+        </p:txBody>
+      </p:sp>
+      <p:sp>
+        <p:nvSpPr>
+          <p:cNvPr id="50" name="Down Arrow 49"/>
+          <p:cNvSpPr/>
+          <p:nvPr/>
+        </p:nvSpPr>
+        <p:spPr>
+          <a:xfrm rot="16200000">
+            <a:off x="6626231" y="3590281"/>
+            <a:ext cx="593387" cy="1698956"/>
+          </a:xfrm>
+          <a:prstGeom prst="downArrow">
+            <a:avLst/>
+          </a:prstGeom>
+        </p:spPr>
+        <p:style>
+          <a:lnRef idx="2">
+            <a:schemeClr val="accent1">
+              <a:shade val="50000"/>
+            </a:schemeClr>
+          </a:lnRef>
+          <a:fillRef idx="1">
+            <a:schemeClr val="accent1"/>
+          </a:fillRef>
+          <a:effectRef idx="0">
+            <a:schemeClr val="accent1"/>
+          </a:effectRef>
+          <a:fontRef idx="minor">
+            <a:schemeClr val="lt1"/>
+          </a:fontRef>
+        </p:style>
+        <p:txBody>
+          <a:bodyPr vert="eaVert" rtlCol="0" anchor="ctr"/>
+          <a:lstStyle/>
+          <a:p>
+            <a:pPr algn="ctr"/>
+            <a:r>
+              <a:rPr lang="en-SG" dirty="0" smtClean="0"/>
+              <a:t>Menu Option</a:t>
+            </a:r>
+            <a:endParaRPr lang="en-SG" dirty="0"/>
+          </a:p>
+        </p:txBody>
+      </p:sp>
+      <p:sp>
+        <p:nvSpPr>
+          <p:cNvPr id="53" name="Down Arrow 52"/>
+          <p:cNvSpPr/>
+          <p:nvPr/>
+        </p:nvSpPr>
+        <p:spPr>
+          <a:xfrm>
+            <a:off x="8658769" y="0"/>
+            <a:ext cx="593387" cy="1640003"/>
+          </a:xfrm>
+          <a:prstGeom prst="downArrow">
+            <a:avLst/>
+          </a:prstGeom>
+        </p:spPr>
+        <p:style>
+          <a:lnRef idx="2">
+            <a:schemeClr val="accent1">
+              <a:shade val="50000"/>
+            </a:schemeClr>
+          </a:lnRef>
+          <a:fillRef idx="1">
+            <a:schemeClr val="accent1"/>
+          </a:fillRef>
+          <a:effectRef idx="0">
+            <a:schemeClr val="accent1"/>
+          </a:effectRef>
+          <a:fontRef idx="minor">
+            <a:schemeClr val="lt1"/>
+          </a:fontRef>
+        </p:style>
+        <p:txBody>
+          <a:bodyPr vert="eaVert" rtlCol="0" anchor="ctr"/>
+          <a:lstStyle/>
+          <a:p>
+            <a:pPr algn="ctr"/>
+            <a:r>
+              <a:rPr lang="en-SG" dirty="0" smtClean="0"/>
+              <a:t>tabs</a:t>
+            </a:r>
+            <a:endParaRPr lang="en-SG" dirty="0"/>
+          </a:p>
+        </p:txBody>
+      </p:sp>
+    </p:spTree>
+    <p:extLst>
+      <p:ext uri="{BB962C8B-B14F-4D97-AF65-F5344CB8AC3E}">
+        <p14:creationId xmlns:p14="http://schemas.microsoft.com/office/powerpoint/2010/main" val="4257138952"/>
+      </p:ext>
+    </p:extLst>
+  </p:cSld>
+  <p:clrMapOvr>
+    <a:masterClrMapping/>
+  </p:clrMapOvr>
+  <p:timing>
+    <p:tnLst>
+      <p:par>
+        <p:cTn id="1" dur="indefinite" restart="never" nodeType="tmRoot"/>
+      </p:par>
+    </p:tnLst>
+  </p:timing>
+</p:sld>
+</file>
+
+<file path=ppt/slides/slide6.xml><?xml version="1.0" encoding="utf-8"?>
 <p:sld xmlns:a="http://schemas.openxmlformats.org/drawingml/2006/main" xmlns:r="http://schemas.openxmlformats.org/officeDocument/2006/relationships" xmlns:p="http://schemas.openxmlformats.org/presentationml/2006/main">
   <p:cSld>
     <p:spTree>
@@ -13794,7 +14421,7 @@
 </p:sld>
 </file>
 
-<file path=ppt/slides/slide6.xml><?xml version="1.0" encoding="utf-8"?>
+<file path=ppt/slides/slide7.xml><?xml version="1.0" encoding="utf-8"?>
 <p:sld xmlns:a="http://schemas.openxmlformats.org/drawingml/2006/main" xmlns:r="http://schemas.openxmlformats.org/officeDocument/2006/relationships" xmlns:p="http://schemas.openxmlformats.org/presentationml/2006/main">
   <p:cSld>
     <p:spTree>

</xml_diff>